<commit_message>
Updated presentation with new diagrams
</commit_message>
<xml_diff>
--- a/Design/Milestone-Presentation.pptx
+++ b/Design/Milestone-Presentation.pptx
@@ -38,14 +38,14 @@
   <p:notesSz cx="6858000" cy="9144000"/>
   <p:embeddedFontLst>
     <p:embeddedFont>
-      <p:font typeface="Quattrocento Sans" charset="0"/>
-      <p:bold r:id="rId28"/>
-      <p:italic r:id="rId29"/>
-      <p:boldItalic r:id="rId30"/>
+      <p:font typeface="Lora" charset="0"/>
+      <p:regular r:id="rId28"/>
+      <p:bold r:id="rId29"/>
+      <p:italic r:id="rId30"/>
+      <p:boldItalic r:id="rId31"/>
     </p:embeddedFont>
     <p:embeddedFont>
-      <p:font typeface="Lora" charset="0"/>
-      <p:regular r:id="rId31"/>
+      <p:font typeface="Quattrocento Sans" charset="0"/>
       <p:bold r:id="rId32"/>
       <p:italic r:id="rId33"/>
       <p:boldItalic r:id="rId34"/>
@@ -646,7 +646,12 @@
             <p:ph type="sldImg"/>
           </p:nvPr>
         </p:nvSpPr>
-        <p:spPr/>
+        <p:spPr>
+          <a:xfrm>
+            <a:off x="381000" y="685800"/>
+            <a:ext cx="6096000" cy="3429000"/>
+          </a:xfrm>
+        </p:spPr>
       </p:sp>
       <p:sp>
         <p:nvSpPr>
@@ -5917,15 +5922,14 @@
               </a:ext>
             </a:extLst>
           </a:blip>
-          <a:srcRect/>
           <a:stretch>
             <a:fillRect/>
           </a:stretch>
         </p:blipFill>
         <p:spPr bwMode="auto">
           <a:xfrm>
-            <a:off x="917848" y="0"/>
-            <a:ext cx="7308304" cy="5309850"/>
+            <a:off x="917848" y="1"/>
+            <a:ext cx="7308304" cy="5309848"/>
           </a:xfrm>
           <a:prstGeom prst="rect">
             <a:avLst/>
@@ -8501,7 +8505,6 @@
               <a:rPr lang="de-DE" dirty="0" smtClean="0"/>
               <a:t>Erweiterbar</a:t>
             </a:r>
-            <a:endParaRPr lang="de-DE" dirty="0" smtClean="0"/>
           </a:p>
           <a:p>
             <a:pPr marL="457200" lvl="0" indent="-228600" rtl="0">
@@ -8513,7 +8516,6 @@
               <a:rPr lang="de-DE" dirty="0" smtClean="0"/>
               <a:t>Wiederverwendbar</a:t>
             </a:r>
-            <a:endParaRPr lang="de-DE" dirty="0" smtClean="0"/>
           </a:p>
         </p:txBody>
       </p:sp>

</xml_diff>

<commit_message>
Final design presentation iteration
</commit_message>
<xml_diff>
--- a/Design/Milestone-Presentation.pptx
+++ b/Design/Milestone-Presentation.pptx
@@ -5,7 +5,7 @@
     <p:sldMasterId id="2147483658" r:id="rId1"/>
   </p:sldMasterIdLst>
   <p:notesMasterIdLst>
-    <p:notesMasterId r:id="rId27"/>
+    <p:notesMasterId r:id="rId29"/>
   </p:notesMasterIdLst>
   <p:sldIdLst>
     <p:sldId id="256" r:id="rId2"/>
@@ -31,24 +31,26 @@
     <p:sldId id="314" r:id="rId22"/>
     <p:sldId id="306" r:id="rId23"/>
     <p:sldId id="299" r:id="rId24"/>
-    <p:sldId id="280" r:id="rId25"/>
-    <p:sldId id="281" r:id="rId26"/>
+    <p:sldId id="316" r:id="rId25"/>
+    <p:sldId id="317" r:id="rId26"/>
+    <p:sldId id="280" r:id="rId27"/>
+    <p:sldId id="281" r:id="rId28"/>
   </p:sldIdLst>
   <p:sldSz cx="9144000" cy="5143500" type="screen16x9"/>
   <p:notesSz cx="6858000" cy="9144000"/>
   <p:embeddedFontLst>
     <p:embeddedFont>
       <p:font typeface="Lora" charset="0"/>
-      <p:regular r:id="rId28"/>
-      <p:bold r:id="rId29"/>
-      <p:italic r:id="rId30"/>
-      <p:boldItalic r:id="rId31"/>
+      <p:regular r:id="rId30"/>
+      <p:bold r:id="rId31"/>
+      <p:italic r:id="rId32"/>
+      <p:boldItalic r:id="rId33"/>
     </p:embeddedFont>
     <p:embeddedFont>
       <p:font typeface="Quattrocento Sans" charset="0"/>
-      <p:bold r:id="rId32"/>
-      <p:italic r:id="rId33"/>
-      <p:boldItalic r:id="rId34"/>
+      <p:bold r:id="rId34"/>
+      <p:italic r:id="rId35"/>
+      <p:boldItalic r:id="rId36"/>
     </p:embeddedFont>
   </p:embeddedFontLst>
   <p:defaultTextStyle>
@@ -26661,6 +26663,161 @@
   <p:cSld>
     <p:spTree>
       <p:nvGrpSpPr>
+        <p:cNvPr id="1" name=""/>
+        <p:cNvGrpSpPr/>
+        <p:nvPr/>
+      </p:nvGrpSpPr>
+      <p:grpSpPr>
+        <a:xfrm>
+          <a:off x="0" y="0"/>
+          <a:ext cx="0" cy="0"/>
+          <a:chOff x="0" y="0"/>
+          <a:chExt cx="0" cy="0"/>
+        </a:xfrm>
+      </p:grpSpPr>
+      <p:pic>
+        <p:nvPicPr>
+          <p:cNvPr id="1026" name="Picture 2" descr="C:\Workspace\OOT-Projekt\Design\GameQuestionSequence.jpg"/>
+          <p:cNvPicPr>
+            <a:picLocks noChangeAspect="1" noChangeArrowheads="1"/>
+          </p:cNvPicPr>
+          <p:nvPr/>
+        </p:nvPicPr>
+        <p:blipFill>
+          <a:blip r:embed="rId2">
+            <a:extLst>
+              <a:ext uri="{28A0092B-C50C-407E-A947-70E740481C1C}">
+                <a14:useLocalDpi xmlns:a14="http://schemas.microsoft.com/office/drawing/2010/main" val="0"/>
+              </a:ext>
+            </a:extLst>
+          </a:blip>
+          <a:srcRect/>
+          <a:stretch>
+            <a:fillRect/>
+          </a:stretch>
+        </p:blipFill>
+        <p:spPr bwMode="auto">
+          <a:xfrm>
+            <a:off x="2562337" y="78603"/>
+            <a:ext cx="4019326" cy="4986294"/>
+          </a:xfrm>
+          <a:prstGeom prst="rect">
+            <a:avLst/>
+          </a:prstGeom>
+          <a:noFill/>
+          <a:extLst>
+            <a:ext uri="{909E8E84-426E-40DD-AFC4-6F175D3DCCD1}">
+              <a14:hiddenFill xmlns:a14="http://schemas.microsoft.com/office/drawing/2010/main">
+                <a:solidFill>
+                  <a:srgbClr val="FFFFFF"/>
+                </a:solidFill>
+              </a14:hiddenFill>
+            </a:ext>
+          </a:extLst>
+        </p:spPr>
+      </p:pic>
+    </p:spTree>
+    <p:extLst>
+      <p:ext uri="{BB962C8B-B14F-4D97-AF65-F5344CB8AC3E}">
+        <p14:creationId xmlns:p14="http://schemas.microsoft.com/office/powerpoint/2010/main" val="1866469424"/>
+      </p:ext>
+    </p:extLst>
+  </p:cSld>
+  <p:clrMapOvr>
+    <a:masterClrMapping/>
+  </p:clrMapOvr>
+  <p:timing>
+    <p:tnLst>
+      <p:par>
+        <p:cTn id="1" dur="indefinite" restart="never" nodeType="tmRoot"/>
+      </p:par>
+    </p:tnLst>
+  </p:timing>
+</p:sld>
+</file>
+
+<file path=ppt/slides/slide25.xml><?xml version="1.0" encoding="utf-8"?>
+<p:sld xmlns:a="http://schemas.openxmlformats.org/drawingml/2006/main" xmlns:r="http://schemas.openxmlformats.org/officeDocument/2006/relationships" xmlns:p="http://schemas.openxmlformats.org/presentationml/2006/main">
+  <p:cSld>
+    <p:spTree>
+      <p:nvGrpSpPr>
+        <p:cNvPr id="1" name=""/>
+        <p:cNvGrpSpPr/>
+        <p:nvPr/>
+      </p:nvGrpSpPr>
+      <p:grpSpPr>
+        <a:xfrm>
+          <a:off x="0" y="0"/>
+          <a:ext cx="0" cy="0"/>
+          <a:chOff x="0" y="0"/>
+          <a:chExt cx="0" cy="0"/>
+        </a:xfrm>
+      </p:grpSpPr>
+      <p:pic>
+        <p:nvPicPr>
+          <p:cNvPr id="1026" name="Picture 2"/>
+          <p:cNvPicPr>
+            <a:picLocks noChangeAspect="1" noChangeArrowheads="1"/>
+          </p:cNvPicPr>
+          <p:nvPr/>
+        </p:nvPicPr>
+        <p:blipFill>
+          <a:blip r:embed="rId2">
+            <a:extLst>
+              <a:ext uri="{28A0092B-C50C-407E-A947-70E740481C1C}">
+                <a14:useLocalDpi xmlns:a14="http://schemas.microsoft.com/office/drawing/2010/main" val="0"/>
+              </a:ext>
+            </a:extLst>
+          </a:blip>
+          <a:stretch>
+            <a:fillRect/>
+          </a:stretch>
+        </p:blipFill>
+        <p:spPr bwMode="auto">
+          <a:xfrm>
+            <a:off x="2451045" y="207706"/>
+            <a:ext cx="4241911" cy="4728089"/>
+          </a:xfrm>
+          <a:prstGeom prst="rect">
+            <a:avLst/>
+          </a:prstGeom>
+          <a:noFill/>
+          <a:extLst>
+            <a:ext uri="{909E8E84-426E-40DD-AFC4-6F175D3DCCD1}">
+              <a14:hiddenFill xmlns:a14="http://schemas.microsoft.com/office/drawing/2010/main">
+                <a:solidFill>
+                  <a:srgbClr val="FFFFFF"/>
+                </a:solidFill>
+              </a14:hiddenFill>
+            </a:ext>
+          </a:extLst>
+        </p:spPr>
+      </p:pic>
+    </p:spTree>
+    <p:extLst>
+      <p:ext uri="{BB962C8B-B14F-4D97-AF65-F5344CB8AC3E}">
+        <p14:creationId xmlns:p14="http://schemas.microsoft.com/office/powerpoint/2010/main" val="923674730"/>
+      </p:ext>
+    </p:extLst>
+  </p:cSld>
+  <p:clrMapOvr>
+    <a:masterClrMapping/>
+  </p:clrMapOvr>
+  <p:timing>
+    <p:tnLst>
+      <p:par>
+        <p:cTn id="1" dur="indefinite" restart="never" nodeType="tmRoot"/>
+      </p:par>
+    </p:tnLst>
+  </p:timing>
+</p:sld>
+</file>
+
+<file path=ppt/slides/slide26.xml><?xml version="1.0" encoding="utf-8"?>
+<p:sld xmlns:a="http://schemas.openxmlformats.org/drawingml/2006/main" xmlns:r="http://schemas.openxmlformats.org/officeDocument/2006/relationships" xmlns:p="http://schemas.openxmlformats.org/presentationml/2006/main">
+  <p:cSld>
+    <p:spTree>
+      <p:nvGrpSpPr>
         <p:cNvPr id="1" name="Shape 375"/>
         <p:cNvGrpSpPr/>
         <p:nvPr/>
@@ -27553,7 +27710,7 @@
 </p:sld>
 </file>
 
-<file path=ppt/slides/slide25.xml><?xml version="1.0" encoding="utf-8"?>
+<file path=ppt/slides/slide27.xml><?xml version="1.0" encoding="utf-8"?>
 <p:sld xmlns:a="http://schemas.openxmlformats.org/drawingml/2006/main" xmlns:r="http://schemas.openxmlformats.org/officeDocument/2006/relationships" xmlns:p="http://schemas.openxmlformats.org/presentationml/2006/main">
   <p:cSld>
     <p:spTree>
@@ -30480,7 +30637,7 @@
             </a:pPr>
             <a:r>
               <a:rPr lang="en" dirty="0" smtClean="0"/>
-              <a:t>Projektorganisation</a:t>
+              <a:t>Architektur</a:t>
             </a:r>
             <a:endParaRPr lang="en" dirty="0"/>
           </a:p>
@@ -30492,8 +30649,9 @@
             </a:pPr>
             <a:r>
               <a:rPr lang="en" dirty="0" smtClean="0"/>
-              <a:t>Klassendiagramme</a:t>
+              <a:t>Implementation</a:t>
             </a:r>
+            <a:endParaRPr lang="en" dirty="0" smtClean="0"/>
           </a:p>
           <a:p>
             <a:pPr marL="457200" lvl="0" indent="-228600" rtl="0">
@@ -30503,7 +30661,7 @@
             </a:pPr>
             <a:r>
               <a:rPr lang="en" dirty="0" smtClean="0"/>
-              <a:t>Design-Fazit</a:t>
+              <a:t>Fazit</a:t>
             </a:r>
             <a:endParaRPr lang="en" dirty="0"/>
           </a:p>
@@ -31180,7 +31338,7 @@
             </a:pPr>
             <a:r>
               <a:rPr lang="en" dirty="0" smtClean="0"/>
-              <a:t>Projektorganisation</a:t>
+              <a:t>Architektur</a:t>
             </a:r>
             <a:endParaRPr lang="en" dirty="0"/>
           </a:p>
@@ -33063,7 +33221,7 @@
             </a:pPr>
             <a:r>
               <a:rPr lang="en" dirty="0" smtClean="0"/>
-              <a:t>Klassendiagramme</a:t>
+              <a:t>Implementation</a:t>
             </a:r>
             <a:endParaRPr lang="en" dirty="0"/>
           </a:p>

</xml_diff>